<commit_message>
added links to L9.5 in pptx and pdf on module09.html
</commit_message>
<xml_diff>
--- a/Slides/Lesson 9.5 The Design Recipe Using Classes.pptx
+++ b/Slides/Lesson 9.5 The Design Recipe Using Classes.pptx
@@ -598,6 +598,854 @@
 </p:notes>
 </file>
 
+<file path=ppt/notesSlides/notesSlide10.xml><?xml version="1.0" encoding="utf-8"?>
+<p:notes xmlns:a="http://schemas.openxmlformats.org/drawingml/2006/main" xmlns:r="http://schemas.openxmlformats.org/officeDocument/2006/relationships" xmlns:p="http://schemas.openxmlformats.org/presentationml/2006/main">
+  <p:cSld>
+    <p:spTree>
+      <p:nvGrpSpPr>
+        <p:cNvPr id="1" name=""/>
+        <p:cNvGrpSpPr/>
+        <p:nvPr/>
+      </p:nvGrpSpPr>
+      <p:grpSpPr>
+        <a:xfrm>
+          <a:off x="0" y="0"/>
+          <a:ext cx="0" cy="0"/>
+          <a:chOff x="0" y="0"/>
+          <a:chExt cx="0" cy="0"/>
+        </a:xfrm>
+      </p:grpSpPr>
+      <p:sp>
+        <p:nvSpPr>
+          <p:cNvPr id="2" name="Slide Image Placeholder 1"/>
+          <p:cNvSpPr>
+            <a:spLocks noGrp="1" noRot="1" noChangeAspect="1"/>
+          </p:cNvSpPr>
+          <p:nvPr>
+            <p:ph type="sldImg"/>
+          </p:nvPr>
+        </p:nvSpPr>
+        <p:spPr/>
+      </p:sp>
+      <p:sp>
+        <p:nvSpPr>
+          <p:cNvPr id="3" name="Notes Placeholder 2"/>
+          <p:cNvSpPr>
+            <a:spLocks noGrp="1"/>
+          </p:cNvSpPr>
+          <p:nvPr>
+            <p:ph type="body" idx="1"/>
+          </p:nvPr>
+        </p:nvSpPr>
+        <p:spPr/>
+        <p:txBody>
+          <a:bodyPr/>
+          <a:lstStyle/>
+          <a:p>
+            <a:endParaRPr lang="en-US"/>
+          </a:p>
+        </p:txBody>
+      </p:sp>
+      <p:sp>
+        <p:nvSpPr>
+          <p:cNvPr id="4" name="Slide Number Placeholder 3"/>
+          <p:cNvSpPr>
+            <a:spLocks noGrp="1"/>
+          </p:cNvSpPr>
+          <p:nvPr>
+            <p:ph type="sldNum" sz="quarter" idx="10"/>
+          </p:nvPr>
+        </p:nvSpPr>
+        <p:spPr/>
+        <p:txBody>
+          <a:bodyPr/>
+          <a:lstStyle/>
+          <a:p>
+            <a:fld id="{3876E050-E992-427E-914D-D11B843CAC07}" type="slidenum">
+              <a:rPr lang="en-US" smtClean="0"/>
+              <a:pPr/>
+              <a:t>10</a:t>
+            </a:fld>
+            <a:endParaRPr lang="en-US"/>
+          </a:p>
+        </p:txBody>
+      </p:sp>
+    </p:spTree>
+    <p:extLst>
+      <p:ext uri="{BB962C8B-B14F-4D97-AF65-F5344CB8AC3E}">
+        <p14:creationId xmlns:p14="http://schemas.microsoft.com/office/powerpoint/2010/main" val="4027301322"/>
+      </p:ext>
+    </p:extLst>
+  </p:cSld>
+  <p:clrMapOvr>
+    <a:masterClrMapping/>
+  </p:clrMapOvr>
+</p:notes>
+</file>
+
+<file path=ppt/notesSlides/notesSlide11.xml><?xml version="1.0" encoding="utf-8"?>
+<p:notes xmlns:a="http://schemas.openxmlformats.org/drawingml/2006/main" xmlns:r="http://schemas.openxmlformats.org/officeDocument/2006/relationships" xmlns:p="http://schemas.openxmlformats.org/presentationml/2006/main">
+  <p:cSld>
+    <p:spTree>
+      <p:nvGrpSpPr>
+        <p:cNvPr id="1" name=""/>
+        <p:cNvGrpSpPr/>
+        <p:nvPr/>
+      </p:nvGrpSpPr>
+      <p:grpSpPr>
+        <a:xfrm>
+          <a:off x="0" y="0"/>
+          <a:ext cx="0" cy="0"/>
+          <a:chOff x="0" y="0"/>
+          <a:chExt cx="0" cy="0"/>
+        </a:xfrm>
+      </p:grpSpPr>
+      <p:sp>
+        <p:nvSpPr>
+          <p:cNvPr id="2" name="Slide Image Placeholder 1"/>
+          <p:cNvSpPr>
+            <a:spLocks noGrp="1" noRot="1" noChangeAspect="1"/>
+          </p:cNvSpPr>
+          <p:nvPr>
+            <p:ph type="sldImg"/>
+          </p:nvPr>
+        </p:nvSpPr>
+        <p:spPr/>
+      </p:sp>
+      <p:sp>
+        <p:nvSpPr>
+          <p:cNvPr id="3" name="Notes Placeholder 2"/>
+          <p:cNvSpPr>
+            <a:spLocks noGrp="1"/>
+          </p:cNvSpPr>
+          <p:nvPr>
+            <p:ph type="body" idx="1"/>
+          </p:nvPr>
+        </p:nvSpPr>
+        <p:spPr/>
+        <p:txBody>
+          <a:bodyPr/>
+          <a:lstStyle/>
+          <a:p>
+            <a:endParaRPr lang="en-US"/>
+          </a:p>
+        </p:txBody>
+      </p:sp>
+      <p:sp>
+        <p:nvSpPr>
+          <p:cNvPr id="4" name="Slide Number Placeholder 3"/>
+          <p:cNvSpPr>
+            <a:spLocks noGrp="1"/>
+          </p:cNvSpPr>
+          <p:nvPr>
+            <p:ph type="sldNum" sz="quarter" idx="10"/>
+          </p:nvPr>
+        </p:nvSpPr>
+        <p:spPr/>
+        <p:txBody>
+          <a:bodyPr/>
+          <a:lstStyle/>
+          <a:p>
+            <a:fld id="{3876E050-E992-427E-914D-D11B843CAC07}" type="slidenum">
+              <a:rPr lang="en-US" smtClean="0"/>
+              <a:pPr/>
+              <a:t>11</a:t>
+            </a:fld>
+            <a:endParaRPr lang="en-US"/>
+          </a:p>
+        </p:txBody>
+      </p:sp>
+    </p:spTree>
+    <p:extLst>
+      <p:ext uri="{BB962C8B-B14F-4D97-AF65-F5344CB8AC3E}">
+        <p14:creationId xmlns:p14="http://schemas.microsoft.com/office/powerpoint/2010/main" val="2767224627"/>
+      </p:ext>
+    </p:extLst>
+  </p:cSld>
+  <p:clrMapOvr>
+    <a:masterClrMapping/>
+  </p:clrMapOvr>
+</p:notes>
+</file>
+
+<file path=ppt/notesSlides/notesSlide12.xml><?xml version="1.0" encoding="utf-8"?>
+<p:notes xmlns:a="http://schemas.openxmlformats.org/drawingml/2006/main" xmlns:r="http://schemas.openxmlformats.org/officeDocument/2006/relationships" xmlns:p="http://schemas.openxmlformats.org/presentationml/2006/main">
+  <p:cSld>
+    <p:spTree>
+      <p:nvGrpSpPr>
+        <p:cNvPr id="1" name=""/>
+        <p:cNvGrpSpPr/>
+        <p:nvPr/>
+      </p:nvGrpSpPr>
+      <p:grpSpPr>
+        <a:xfrm>
+          <a:off x="0" y="0"/>
+          <a:ext cx="0" cy="0"/>
+          <a:chOff x="0" y="0"/>
+          <a:chExt cx="0" cy="0"/>
+        </a:xfrm>
+      </p:grpSpPr>
+      <p:sp>
+        <p:nvSpPr>
+          <p:cNvPr id="2" name="Slide Image Placeholder 1"/>
+          <p:cNvSpPr>
+            <a:spLocks noGrp="1" noRot="1" noChangeAspect="1"/>
+          </p:cNvSpPr>
+          <p:nvPr>
+            <p:ph type="sldImg"/>
+          </p:nvPr>
+        </p:nvSpPr>
+        <p:spPr/>
+      </p:sp>
+      <p:sp>
+        <p:nvSpPr>
+          <p:cNvPr id="3" name="Notes Placeholder 2"/>
+          <p:cNvSpPr>
+            <a:spLocks noGrp="1"/>
+          </p:cNvSpPr>
+          <p:nvPr>
+            <p:ph type="body" idx="1"/>
+          </p:nvPr>
+        </p:nvSpPr>
+        <p:spPr/>
+        <p:txBody>
+          <a:bodyPr/>
+          <a:lstStyle/>
+          <a:p>
+            <a:endParaRPr lang="en-US"/>
+          </a:p>
+        </p:txBody>
+      </p:sp>
+      <p:sp>
+        <p:nvSpPr>
+          <p:cNvPr id="4" name="Slide Number Placeholder 3"/>
+          <p:cNvSpPr>
+            <a:spLocks noGrp="1"/>
+          </p:cNvSpPr>
+          <p:nvPr>
+            <p:ph type="sldNum" sz="quarter" idx="10"/>
+          </p:nvPr>
+        </p:nvSpPr>
+        <p:spPr/>
+        <p:txBody>
+          <a:bodyPr/>
+          <a:lstStyle/>
+          <a:p>
+            <a:fld id="{3876E050-E992-427E-914D-D11B843CAC07}" type="slidenum">
+              <a:rPr lang="en-US" smtClean="0"/>
+              <a:pPr/>
+              <a:t>12</a:t>
+            </a:fld>
+            <a:endParaRPr lang="en-US"/>
+          </a:p>
+        </p:txBody>
+      </p:sp>
+    </p:spTree>
+    <p:extLst>
+      <p:ext uri="{BB962C8B-B14F-4D97-AF65-F5344CB8AC3E}">
+        <p14:creationId xmlns:p14="http://schemas.microsoft.com/office/powerpoint/2010/main" val="3396536685"/>
+      </p:ext>
+    </p:extLst>
+  </p:cSld>
+  <p:clrMapOvr>
+    <a:masterClrMapping/>
+  </p:clrMapOvr>
+</p:notes>
+</file>
+
+<file path=ppt/notesSlides/notesSlide13.xml><?xml version="1.0" encoding="utf-8"?>
+<p:notes xmlns:a="http://schemas.openxmlformats.org/drawingml/2006/main" xmlns:r="http://schemas.openxmlformats.org/officeDocument/2006/relationships" xmlns:p="http://schemas.openxmlformats.org/presentationml/2006/main">
+  <p:cSld>
+    <p:spTree>
+      <p:nvGrpSpPr>
+        <p:cNvPr id="1" name=""/>
+        <p:cNvGrpSpPr/>
+        <p:nvPr/>
+      </p:nvGrpSpPr>
+      <p:grpSpPr>
+        <a:xfrm>
+          <a:off x="0" y="0"/>
+          <a:ext cx="0" cy="0"/>
+          <a:chOff x="0" y="0"/>
+          <a:chExt cx="0" cy="0"/>
+        </a:xfrm>
+      </p:grpSpPr>
+      <p:sp>
+        <p:nvSpPr>
+          <p:cNvPr id="2" name="Slide Image Placeholder 1"/>
+          <p:cNvSpPr>
+            <a:spLocks noGrp="1" noRot="1" noChangeAspect="1"/>
+          </p:cNvSpPr>
+          <p:nvPr>
+            <p:ph type="sldImg"/>
+          </p:nvPr>
+        </p:nvSpPr>
+        <p:spPr/>
+      </p:sp>
+      <p:sp>
+        <p:nvSpPr>
+          <p:cNvPr id="3" name="Notes Placeholder 2"/>
+          <p:cNvSpPr>
+            <a:spLocks noGrp="1"/>
+          </p:cNvSpPr>
+          <p:nvPr>
+            <p:ph type="body" idx="1"/>
+          </p:nvPr>
+        </p:nvSpPr>
+        <p:spPr/>
+        <p:txBody>
+          <a:bodyPr/>
+          <a:lstStyle/>
+          <a:p>
+            <a:endParaRPr lang="en-US"/>
+          </a:p>
+        </p:txBody>
+      </p:sp>
+      <p:sp>
+        <p:nvSpPr>
+          <p:cNvPr id="4" name="Slide Number Placeholder 3"/>
+          <p:cNvSpPr>
+            <a:spLocks noGrp="1"/>
+          </p:cNvSpPr>
+          <p:nvPr>
+            <p:ph type="sldNum" sz="quarter" idx="10"/>
+          </p:nvPr>
+        </p:nvSpPr>
+        <p:spPr/>
+        <p:txBody>
+          <a:bodyPr/>
+          <a:lstStyle/>
+          <a:p>
+            <a:fld id="{3876E050-E992-427E-914D-D11B843CAC07}" type="slidenum">
+              <a:rPr lang="en-US" smtClean="0"/>
+              <a:pPr/>
+              <a:t>13</a:t>
+            </a:fld>
+            <a:endParaRPr lang="en-US"/>
+          </a:p>
+        </p:txBody>
+      </p:sp>
+    </p:spTree>
+    <p:extLst>
+      <p:ext uri="{BB962C8B-B14F-4D97-AF65-F5344CB8AC3E}">
+        <p14:creationId xmlns:p14="http://schemas.microsoft.com/office/powerpoint/2010/main" val="684620159"/>
+      </p:ext>
+    </p:extLst>
+  </p:cSld>
+  <p:clrMapOvr>
+    <a:masterClrMapping/>
+  </p:clrMapOvr>
+</p:notes>
+</file>
+
+<file path=ppt/notesSlides/notesSlide14.xml><?xml version="1.0" encoding="utf-8"?>
+<p:notes xmlns:a="http://schemas.openxmlformats.org/drawingml/2006/main" xmlns:r="http://schemas.openxmlformats.org/officeDocument/2006/relationships" xmlns:p="http://schemas.openxmlformats.org/presentationml/2006/main">
+  <p:cSld>
+    <p:spTree>
+      <p:nvGrpSpPr>
+        <p:cNvPr id="1" name=""/>
+        <p:cNvGrpSpPr/>
+        <p:nvPr/>
+      </p:nvGrpSpPr>
+      <p:grpSpPr>
+        <a:xfrm>
+          <a:off x="0" y="0"/>
+          <a:ext cx="0" cy="0"/>
+          <a:chOff x="0" y="0"/>
+          <a:chExt cx="0" cy="0"/>
+        </a:xfrm>
+      </p:grpSpPr>
+      <p:sp>
+        <p:nvSpPr>
+          <p:cNvPr id="2" name="Slide Image Placeholder 1"/>
+          <p:cNvSpPr>
+            <a:spLocks noGrp="1" noRot="1" noChangeAspect="1"/>
+          </p:cNvSpPr>
+          <p:nvPr>
+            <p:ph type="sldImg"/>
+          </p:nvPr>
+        </p:nvSpPr>
+        <p:spPr/>
+      </p:sp>
+      <p:sp>
+        <p:nvSpPr>
+          <p:cNvPr id="3" name="Notes Placeholder 2"/>
+          <p:cNvSpPr>
+            <a:spLocks noGrp="1"/>
+          </p:cNvSpPr>
+          <p:nvPr>
+            <p:ph type="body" idx="1"/>
+          </p:nvPr>
+        </p:nvSpPr>
+        <p:spPr/>
+        <p:txBody>
+          <a:bodyPr/>
+          <a:lstStyle/>
+          <a:p>
+            <a:endParaRPr lang="en-US"/>
+          </a:p>
+        </p:txBody>
+      </p:sp>
+      <p:sp>
+        <p:nvSpPr>
+          <p:cNvPr id="4" name="Slide Number Placeholder 3"/>
+          <p:cNvSpPr>
+            <a:spLocks noGrp="1"/>
+          </p:cNvSpPr>
+          <p:nvPr>
+            <p:ph type="sldNum" sz="quarter" idx="10"/>
+          </p:nvPr>
+        </p:nvSpPr>
+        <p:spPr/>
+        <p:txBody>
+          <a:bodyPr/>
+          <a:lstStyle/>
+          <a:p>
+            <a:fld id="{3876E050-E992-427E-914D-D11B843CAC07}" type="slidenum">
+              <a:rPr lang="en-US" smtClean="0"/>
+              <a:pPr/>
+              <a:t>14</a:t>
+            </a:fld>
+            <a:endParaRPr lang="en-US"/>
+          </a:p>
+        </p:txBody>
+      </p:sp>
+    </p:spTree>
+    <p:extLst>
+      <p:ext uri="{BB962C8B-B14F-4D97-AF65-F5344CB8AC3E}">
+        <p14:creationId xmlns:p14="http://schemas.microsoft.com/office/powerpoint/2010/main" val="605924533"/>
+      </p:ext>
+    </p:extLst>
+  </p:cSld>
+  <p:clrMapOvr>
+    <a:masterClrMapping/>
+  </p:clrMapOvr>
+</p:notes>
+</file>
+
+<file path=ppt/notesSlides/notesSlide15.xml><?xml version="1.0" encoding="utf-8"?>
+<p:notes xmlns:a="http://schemas.openxmlformats.org/drawingml/2006/main" xmlns:r="http://schemas.openxmlformats.org/officeDocument/2006/relationships" xmlns:p="http://schemas.openxmlformats.org/presentationml/2006/main">
+  <p:cSld>
+    <p:spTree>
+      <p:nvGrpSpPr>
+        <p:cNvPr id="1" name=""/>
+        <p:cNvGrpSpPr/>
+        <p:nvPr/>
+      </p:nvGrpSpPr>
+      <p:grpSpPr>
+        <a:xfrm>
+          <a:off x="0" y="0"/>
+          <a:ext cx="0" cy="0"/>
+          <a:chOff x="0" y="0"/>
+          <a:chExt cx="0" cy="0"/>
+        </a:xfrm>
+      </p:grpSpPr>
+      <p:sp>
+        <p:nvSpPr>
+          <p:cNvPr id="2" name="Slide Image Placeholder 1"/>
+          <p:cNvSpPr>
+            <a:spLocks noGrp="1" noRot="1" noChangeAspect="1"/>
+          </p:cNvSpPr>
+          <p:nvPr>
+            <p:ph type="sldImg"/>
+          </p:nvPr>
+        </p:nvSpPr>
+        <p:spPr/>
+      </p:sp>
+      <p:sp>
+        <p:nvSpPr>
+          <p:cNvPr id="3" name="Notes Placeholder 2"/>
+          <p:cNvSpPr>
+            <a:spLocks noGrp="1"/>
+          </p:cNvSpPr>
+          <p:nvPr>
+            <p:ph type="body" idx="1"/>
+          </p:nvPr>
+        </p:nvSpPr>
+        <p:spPr/>
+        <p:txBody>
+          <a:bodyPr/>
+          <a:lstStyle/>
+          <a:p>
+            <a:endParaRPr lang="en-US"/>
+          </a:p>
+        </p:txBody>
+      </p:sp>
+      <p:sp>
+        <p:nvSpPr>
+          <p:cNvPr id="4" name="Slide Number Placeholder 3"/>
+          <p:cNvSpPr>
+            <a:spLocks noGrp="1"/>
+          </p:cNvSpPr>
+          <p:nvPr>
+            <p:ph type="sldNum" sz="quarter" idx="10"/>
+          </p:nvPr>
+        </p:nvSpPr>
+        <p:spPr/>
+        <p:txBody>
+          <a:bodyPr/>
+          <a:lstStyle/>
+          <a:p>
+            <a:fld id="{3876E050-E992-427E-914D-D11B843CAC07}" type="slidenum">
+              <a:rPr lang="en-US" smtClean="0"/>
+              <a:pPr/>
+              <a:t>15</a:t>
+            </a:fld>
+            <a:endParaRPr lang="en-US"/>
+          </a:p>
+        </p:txBody>
+      </p:sp>
+    </p:spTree>
+    <p:extLst>
+      <p:ext uri="{BB962C8B-B14F-4D97-AF65-F5344CB8AC3E}">
+        <p14:creationId xmlns:p14="http://schemas.microsoft.com/office/powerpoint/2010/main" val="2731927503"/>
+      </p:ext>
+    </p:extLst>
+  </p:cSld>
+  <p:clrMapOvr>
+    <a:masterClrMapping/>
+  </p:clrMapOvr>
+</p:notes>
+</file>
+
+<file path=ppt/notesSlides/notesSlide16.xml><?xml version="1.0" encoding="utf-8"?>
+<p:notes xmlns:a="http://schemas.openxmlformats.org/drawingml/2006/main" xmlns:r="http://schemas.openxmlformats.org/officeDocument/2006/relationships" xmlns:p="http://schemas.openxmlformats.org/presentationml/2006/main">
+  <p:cSld>
+    <p:spTree>
+      <p:nvGrpSpPr>
+        <p:cNvPr id="1" name=""/>
+        <p:cNvGrpSpPr/>
+        <p:nvPr/>
+      </p:nvGrpSpPr>
+      <p:grpSpPr>
+        <a:xfrm>
+          <a:off x="0" y="0"/>
+          <a:ext cx="0" cy="0"/>
+          <a:chOff x="0" y="0"/>
+          <a:chExt cx="0" cy="0"/>
+        </a:xfrm>
+      </p:grpSpPr>
+      <p:sp>
+        <p:nvSpPr>
+          <p:cNvPr id="2" name="Slide Image Placeholder 1"/>
+          <p:cNvSpPr>
+            <a:spLocks noGrp="1" noRot="1" noChangeAspect="1"/>
+          </p:cNvSpPr>
+          <p:nvPr>
+            <p:ph type="sldImg"/>
+          </p:nvPr>
+        </p:nvSpPr>
+        <p:spPr/>
+      </p:sp>
+      <p:sp>
+        <p:nvSpPr>
+          <p:cNvPr id="3" name="Notes Placeholder 2"/>
+          <p:cNvSpPr>
+            <a:spLocks noGrp="1"/>
+          </p:cNvSpPr>
+          <p:nvPr>
+            <p:ph type="body" idx="1"/>
+          </p:nvPr>
+        </p:nvSpPr>
+        <p:spPr/>
+        <p:txBody>
+          <a:bodyPr/>
+          <a:lstStyle/>
+          <a:p>
+            <a:endParaRPr lang="en-US"/>
+          </a:p>
+        </p:txBody>
+      </p:sp>
+      <p:sp>
+        <p:nvSpPr>
+          <p:cNvPr id="4" name="Slide Number Placeholder 3"/>
+          <p:cNvSpPr>
+            <a:spLocks noGrp="1"/>
+          </p:cNvSpPr>
+          <p:nvPr>
+            <p:ph type="sldNum" sz="quarter" idx="10"/>
+          </p:nvPr>
+        </p:nvSpPr>
+        <p:spPr/>
+        <p:txBody>
+          <a:bodyPr/>
+          <a:lstStyle/>
+          <a:p>
+            <a:fld id="{3876E050-E992-427E-914D-D11B843CAC07}" type="slidenum">
+              <a:rPr lang="en-US" smtClean="0"/>
+              <a:pPr/>
+              <a:t>16</a:t>
+            </a:fld>
+            <a:endParaRPr lang="en-US"/>
+          </a:p>
+        </p:txBody>
+      </p:sp>
+    </p:spTree>
+    <p:extLst>
+      <p:ext uri="{BB962C8B-B14F-4D97-AF65-F5344CB8AC3E}">
+        <p14:creationId xmlns:p14="http://schemas.microsoft.com/office/powerpoint/2010/main" val="4252100859"/>
+      </p:ext>
+    </p:extLst>
+  </p:cSld>
+  <p:clrMapOvr>
+    <a:masterClrMapping/>
+  </p:clrMapOvr>
+</p:notes>
+</file>
+
+<file path=ppt/notesSlides/notesSlide17.xml><?xml version="1.0" encoding="utf-8"?>
+<p:notes xmlns:a="http://schemas.openxmlformats.org/drawingml/2006/main" xmlns:r="http://schemas.openxmlformats.org/officeDocument/2006/relationships" xmlns:p="http://schemas.openxmlformats.org/presentationml/2006/main">
+  <p:cSld>
+    <p:spTree>
+      <p:nvGrpSpPr>
+        <p:cNvPr id="1" name=""/>
+        <p:cNvGrpSpPr/>
+        <p:nvPr/>
+      </p:nvGrpSpPr>
+      <p:grpSpPr>
+        <a:xfrm>
+          <a:off x="0" y="0"/>
+          <a:ext cx="0" cy="0"/>
+          <a:chOff x="0" y="0"/>
+          <a:chExt cx="0" cy="0"/>
+        </a:xfrm>
+      </p:grpSpPr>
+      <p:sp>
+        <p:nvSpPr>
+          <p:cNvPr id="2" name="Slide Image Placeholder 1"/>
+          <p:cNvSpPr>
+            <a:spLocks noGrp="1" noRot="1" noChangeAspect="1"/>
+          </p:cNvSpPr>
+          <p:nvPr>
+            <p:ph type="sldImg"/>
+          </p:nvPr>
+        </p:nvSpPr>
+        <p:spPr/>
+      </p:sp>
+      <p:sp>
+        <p:nvSpPr>
+          <p:cNvPr id="3" name="Notes Placeholder 2"/>
+          <p:cNvSpPr>
+            <a:spLocks noGrp="1"/>
+          </p:cNvSpPr>
+          <p:nvPr>
+            <p:ph type="body" idx="1"/>
+          </p:nvPr>
+        </p:nvSpPr>
+        <p:spPr/>
+        <p:txBody>
+          <a:bodyPr/>
+          <a:lstStyle/>
+          <a:p>
+            <a:endParaRPr lang="en-US"/>
+          </a:p>
+        </p:txBody>
+      </p:sp>
+      <p:sp>
+        <p:nvSpPr>
+          <p:cNvPr id="4" name="Slide Number Placeholder 3"/>
+          <p:cNvSpPr>
+            <a:spLocks noGrp="1"/>
+          </p:cNvSpPr>
+          <p:nvPr>
+            <p:ph type="sldNum" sz="quarter" idx="10"/>
+          </p:nvPr>
+        </p:nvSpPr>
+        <p:spPr/>
+        <p:txBody>
+          <a:bodyPr/>
+          <a:lstStyle/>
+          <a:p>
+            <a:fld id="{3876E050-E992-427E-914D-D11B843CAC07}" type="slidenum">
+              <a:rPr lang="en-US" smtClean="0"/>
+              <a:pPr/>
+              <a:t>17</a:t>
+            </a:fld>
+            <a:endParaRPr lang="en-US"/>
+          </a:p>
+        </p:txBody>
+      </p:sp>
+    </p:spTree>
+    <p:extLst>
+      <p:ext uri="{BB962C8B-B14F-4D97-AF65-F5344CB8AC3E}">
+        <p14:creationId xmlns:p14="http://schemas.microsoft.com/office/powerpoint/2010/main" val="1837819777"/>
+      </p:ext>
+    </p:extLst>
+  </p:cSld>
+  <p:clrMapOvr>
+    <a:masterClrMapping/>
+  </p:clrMapOvr>
+</p:notes>
+</file>
+
+<file path=ppt/notesSlides/notesSlide18.xml><?xml version="1.0" encoding="utf-8"?>
+<p:notes xmlns:a="http://schemas.openxmlformats.org/drawingml/2006/main" xmlns:r="http://schemas.openxmlformats.org/officeDocument/2006/relationships" xmlns:p="http://schemas.openxmlformats.org/presentationml/2006/main">
+  <p:cSld>
+    <p:spTree>
+      <p:nvGrpSpPr>
+        <p:cNvPr id="1" name=""/>
+        <p:cNvGrpSpPr/>
+        <p:nvPr/>
+      </p:nvGrpSpPr>
+      <p:grpSpPr>
+        <a:xfrm>
+          <a:off x="0" y="0"/>
+          <a:ext cx="0" cy="0"/>
+          <a:chOff x="0" y="0"/>
+          <a:chExt cx="0" cy="0"/>
+        </a:xfrm>
+      </p:grpSpPr>
+      <p:sp>
+        <p:nvSpPr>
+          <p:cNvPr id="2" name="Slide Image Placeholder 1"/>
+          <p:cNvSpPr>
+            <a:spLocks noGrp="1" noRot="1" noChangeAspect="1"/>
+          </p:cNvSpPr>
+          <p:nvPr>
+            <p:ph type="sldImg"/>
+          </p:nvPr>
+        </p:nvSpPr>
+        <p:spPr/>
+      </p:sp>
+      <p:sp>
+        <p:nvSpPr>
+          <p:cNvPr id="3" name="Notes Placeholder 2"/>
+          <p:cNvSpPr>
+            <a:spLocks noGrp="1"/>
+          </p:cNvSpPr>
+          <p:nvPr>
+            <p:ph type="body" idx="1"/>
+          </p:nvPr>
+        </p:nvSpPr>
+        <p:spPr/>
+        <p:txBody>
+          <a:bodyPr/>
+          <a:lstStyle/>
+          <a:p>
+            <a:endParaRPr lang="en-US" b="1" dirty="0"/>
+          </a:p>
+        </p:txBody>
+      </p:sp>
+      <p:sp>
+        <p:nvSpPr>
+          <p:cNvPr id="4" name="Slide Number Placeholder 3"/>
+          <p:cNvSpPr>
+            <a:spLocks noGrp="1"/>
+          </p:cNvSpPr>
+          <p:nvPr>
+            <p:ph type="sldNum" sz="quarter" idx="10"/>
+          </p:nvPr>
+        </p:nvSpPr>
+        <p:spPr/>
+        <p:txBody>
+          <a:bodyPr/>
+          <a:lstStyle/>
+          <a:p>
+            <a:fld id="{D3C86B6F-9679-C544-B86B-D18AA0460570}" type="slidenum">
+              <a:rPr lang="en-US" smtClean="0"/>
+              <a:t>18</a:t>
+            </a:fld>
+            <a:endParaRPr lang="en-US"/>
+          </a:p>
+        </p:txBody>
+      </p:sp>
+    </p:spTree>
+    <p:extLst>
+      <p:ext uri="{BB962C8B-B14F-4D97-AF65-F5344CB8AC3E}">
+        <p14:creationId xmlns:p14="http://schemas.microsoft.com/office/powerpoint/2010/main" val="3085232185"/>
+      </p:ext>
+    </p:extLst>
+  </p:cSld>
+  <p:clrMapOvr>
+    <a:masterClrMapping/>
+  </p:clrMapOvr>
+</p:notes>
+</file>
+
+<file path=ppt/notesSlides/notesSlide19.xml><?xml version="1.0" encoding="utf-8"?>
+<p:notes xmlns:a="http://schemas.openxmlformats.org/drawingml/2006/main" xmlns:r="http://schemas.openxmlformats.org/officeDocument/2006/relationships" xmlns:p="http://schemas.openxmlformats.org/presentationml/2006/main">
+  <p:cSld>
+    <p:spTree>
+      <p:nvGrpSpPr>
+        <p:cNvPr id="1" name=""/>
+        <p:cNvGrpSpPr/>
+        <p:nvPr/>
+      </p:nvGrpSpPr>
+      <p:grpSpPr>
+        <a:xfrm>
+          <a:off x="0" y="0"/>
+          <a:ext cx="0" cy="0"/>
+          <a:chOff x="0" y="0"/>
+          <a:chExt cx="0" cy="0"/>
+        </a:xfrm>
+      </p:grpSpPr>
+      <p:sp>
+        <p:nvSpPr>
+          <p:cNvPr id="2" name="Slide Image Placeholder 1"/>
+          <p:cNvSpPr>
+            <a:spLocks noGrp="1" noRot="1" noChangeAspect="1"/>
+          </p:cNvSpPr>
+          <p:nvPr>
+            <p:ph type="sldImg"/>
+          </p:nvPr>
+        </p:nvSpPr>
+        <p:spPr/>
+      </p:sp>
+      <p:sp>
+        <p:nvSpPr>
+          <p:cNvPr id="3" name="Notes Placeholder 2"/>
+          <p:cNvSpPr>
+            <a:spLocks noGrp="1"/>
+          </p:cNvSpPr>
+          <p:nvPr>
+            <p:ph type="body" idx="1"/>
+          </p:nvPr>
+        </p:nvSpPr>
+        <p:spPr/>
+        <p:txBody>
+          <a:bodyPr/>
+          <a:lstStyle/>
+          <a:p>
+            <a:endParaRPr lang="en-US" dirty="0"/>
+          </a:p>
+        </p:txBody>
+      </p:sp>
+      <p:sp>
+        <p:nvSpPr>
+          <p:cNvPr id="4" name="Slide Number Placeholder 3"/>
+          <p:cNvSpPr>
+            <a:spLocks noGrp="1"/>
+          </p:cNvSpPr>
+          <p:nvPr>
+            <p:ph type="sldNum" sz="quarter" idx="10"/>
+          </p:nvPr>
+        </p:nvSpPr>
+        <p:spPr/>
+        <p:txBody>
+          <a:bodyPr/>
+          <a:lstStyle/>
+          <a:p>
+            <a:fld id="{D3C86B6F-9679-C544-B86B-D18AA0460570}" type="slidenum">
+              <a:rPr lang="en-US" smtClean="0"/>
+              <a:t>19</a:t>
+            </a:fld>
+            <a:endParaRPr lang="en-US"/>
+          </a:p>
+        </p:txBody>
+      </p:sp>
+    </p:spTree>
+    <p:extLst>
+      <p:ext uri="{BB962C8B-B14F-4D97-AF65-F5344CB8AC3E}">
+        <p14:creationId xmlns:p14="http://schemas.microsoft.com/office/powerpoint/2010/main" val="365138427"/>
+      </p:ext>
+    </p:extLst>
+  </p:cSld>
+  <p:clrMapOvr>
+    <a:masterClrMapping/>
+  </p:clrMapOvr>
+</p:notes>
+</file>
+
 <file path=ppt/notesSlides/notesSlide2.xml><?xml version="1.0" encoding="utf-8"?>
 <p:notes xmlns:a="http://schemas.openxmlformats.org/drawingml/2006/main" xmlns:r="http://schemas.openxmlformats.org/officeDocument/2006/relationships" xmlns:p="http://schemas.openxmlformats.org/presentationml/2006/main">
   <p:cSld>
@@ -642,7 +1490,7 @@
           <a:bodyPr/>
           <a:lstStyle/>
           <a:p>
-            <a:endParaRPr lang="en-US" dirty="0"/>
+            <a:endParaRPr lang="en-US"/>
           </a:p>
         </p:txBody>
       </p:sp>
@@ -664,7 +1512,7 @@
             <a:fld id="{3876E050-E992-427E-914D-D11B843CAC07}" type="slidenum">
               <a:rPr lang="en-US" smtClean="0"/>
               <a:pPr/>
-              <a:t>5</a:t>
+              <a:t>2</a:t>
             </a:fld>
             <a:endParaRPr lang="en-US"/>
           </a:p>
@@ -673,7 +1521,772 @@
     </p:spTree>
     <p:extLst>
       <p:ext uri="{BB962C8B-B14F-4D97-AF65-F5344CB8AC3E}">
-        <p14:creationId xmlns:p14="http://schemas.microsoft.com/office/powerpoint/2010/main" val="2129791700"/>
+        <p14:creationId xmlns:p14="http://schemas.microsoft.com/office/powerpoint/2010/main" val="4133107616"/>
+      </p:ext>
+    </p:extLst>
+  </p:cSld>
+  <p:clrMapOvr>
+    <a:masterClrMapping/>
+  </p:clrMapOvr>
+</p:notes>
+</file>
+
+<file path=ppt/notesSlides/notesSlide20.xml><?xml version="1.0" encoding="utf-8"?>
+<p:notes xmlns:a="http://schemas.openxmlformats.org/drawingml/2006/main" xmlns:r="http://schemas.openxmlformats.org/officeDocument/2006/relationships" xmlns:p="http://schemas.openxmlformats.org/presentationml/2006/main">
+  <p:cSld>
+    <p:spTree>
+      <p:nvGrpSpPr>
+        <p:cNvPr id="1" name=""/>
+        <p:cNvGrpSpPr/>
+        <p:nvPr/>
+      </p:nvGrpSpPr>
+      <p:grpSpPr>
+        <a:xfrm>
+          <a:off x="0" y="0"/>
+          <a:ext cx="0" cy="0"/>
+          <a:chOff x="0" y="0"/>
+          <a:chExt cx="0" cy="0"/>
+        </a:xfrm>
+      </p:grpSpPr>
+      <p:sp>
+        <p:nvSpPr>
+          <p:cNvPr id="2" name="Slide Image Placeholder 1"/>
+          <p:cNvSpPr>
+            <a:spLocks noGrp="1" noRot="1" noChangeAspect="1"/>
+          </p:cNvSpPr>
+          <p:nvPr>
+            <p:ph type="sldImg"/>
+          </p:nvPr>
+        </p:nvSpPr>
+        <p:spPr/>
+      </p:sp>
+      <p:sp>
+        <p:nvSpPr>
+          <p:cNvPr id="3" name="Notes Placeholder 2"/>
+          <p:cNvSpPr>
+            <a:spLocks noGrp="1"/>
+          </p:cNvSpPr>
+          <p:nvPr>
+            <p:ph type="body" idx="1"/>
+          </p:nvPr>
+        </p:nvSpPr>
+        <p:spPr/>
+        <p:txBody>
+          <a:bodyPr/>
+          <a:lstStyle/>
+          <a:p>
+            <a:endParaRPr lang="en-US"/>
+          </a:p>
+        </p:txBody>
+      </p:sp>
+      <p:sp>
+        <p:nvSpPr>
+          <p:cNvPr id="4" name="Slide Number Placeholder 3"/>
+          <p:cNvSpPr>
+            <a:spLocks noGrp="1"/>
+          </p:cNvSpPr>
+          <p:nvPr>
+            <p:ph type="sldNum" sz="quarter" idx="10"/>
+          </p:nvPr>
+        </p:nvSpPr>
+        <p:spPr/>
+        <p:txBody>
+          <a:bodyPr/>
+          <a:lstStyle/>
+          <a:p>
+            <a:fld id="{3876E050-E992-427E-914D-D11B843CAC07}" type="slidenum">
+              <a:rPr lang="en-US" smtClean="0"/>
+              <a:pPr/>
+              <a:t>20</a:t>
+            </a:fld>
+            <a:endParaRPr lang="en-US"/>
+          </a:p>
+        </p:txBody>
+      </p:sp>
+    </p:spTree>
+    <p:extLst>
+      <p:ext uri="{BB962C8B-B14F-4D97-AF65-F5344CB8AC3E}">
+        <p14:creationId xmlns:p14="http://schemas.microsoft.com/office/powerpoint/2010/main" val="1913190507"/>
+      </p:ext>
+    </p:extLst>
+  </p:cSld>
+  <p:clrMapOvr>
+    <a:masterClrMapping/>
+  </p:clrMapOvr>
+</p:notes>
+</file>
+
+<file path=ppt/notesSlides/notesSlide21.xml><?xml version="1.0" encoding="utf-8"?>
+<p:notes xmlns:a="http://schemas.openxmlformats.org/drawingml/2006/main" xmlns:r="http://schemas.openxmlformats.org/officeDocument/2006/relationships" xmlns:p="http://schemas.openxmlformats.org/presentationml/2006/main">
+  <p:cSld>
+    <p:spTree>
+      <p:nvGrpSpPr>
+        <p:cNvPr id="1" name=""/>
+        <p:cNvGrpSpPr/>
+        <p:nvPr/>
+      </p:nvGrpSpPr>
+      <p:grpSpPr>
+        <a:xfrm>
+          <a:off x="0" y="0"/>
+          <a:ext cx="0" cy="0"/>
+          <a:chOff x="0" y="0"/>
+          <a:chExt cx="0" cy="0"/>
+        </a:xfrm>
+      </p:grpSpPr>
+      <p:sp>
+        <p:nvSpPr>
+          <p:cNvPr id="2" name="Slide Image Placeholder 1"/>
+          <p:cNvSpPr>
+            <a:spLocks noGrp="1" noRot="1" noChangeAspect="1"/>
+          </p:cNvSpPr>
+          <p:nvPr>
+            <p:ph type="sldImg"/>
+          </p:nvPr>
+        </p:nvSpPr>
+        <p:spPr/>
+      </p:sp>
+      <p:sp>
+        <p:nvSpPr>
+          <p:cNvPr id="3" name="Notes Placeholder 2"/>
+          <p:cNvSpPr>
+            <a:spLocks noGrp="1"/>
+          </p:cNvSpPr>
+          <p:nvPr>
+            <p:ph type="body" idx="1"/>
+          </p:nvPr>
+        </p:nvSpPr>
+        <p:spPr/>
+        <p:txBody>
+          <a:bodyPr/>
+          <a:lstStyle/>
+          <a:p>
+            <a:endParaRPr lang="en-US"/>
+          </a:p>
+        </p:txBody>
+      </p:sp>
+      <p:sp>
+        <p:nvSpPr>
+          <p:cNvPr id="4" name="Slide Number Placeholder 3"/>
+          <p:cNvSpPr>
+            <a:spLocks noGrp="1"/>
+          </p:cNvSpPr>
+          <p:nvPr>
+            <p:ph type="sldNum" sz="quarter" idx="10"/>
+          </p:nvPr>
+        </p:nvSpPr>
+        <p:spPr/>
+        <p:txBody>
+          <a:bodyPr/>
+          <a:lstStyle/>
+          <a:p>
+            <a:fld id="{3876E050-E992-427E-914D-D11B843CAC07}" type="slidenum">
+              <a:rPr lang="en-US" smtClean="0"/>
+              <a:pPr/>
+              <a:t>21</a:t>
+            </a:fld>
+            <a:endParaRPr lang="en-US"/>
+          </a:p>
+        </p:txBody>
+      </p:sp>
+    </p:spTree>
+    <p:extLst>
+      <p:ext uri="{BB962C8B-B14F-4D97-AF65-F5344CB8AC3E}">
+        <p14:creationId xmlns:p14="http://schemas.microsoft.com/office/powerpoint/2010/main" val="1967712830"/>
+      </p:ext>
+    </p:extLst>
+  </p:cSld>
+  <p:clrMapOvr>
+    <a:masterClrMapping/>
+  </p:clrMapOvr>
+</p:notes>
+</file>
+
+<file path=ppt/notesSlides/notesSlide22.xml><?xml version="1.0" encoding="utf-8"?>
+<p:notes xmlns:a="http://schemas.openxmlformats.org/drawingml/2006/main" xmlns:r="http://schemas.openxmlformats.org/officeDocument/2006/relationships" xmlns:p="http://schemas.openxmlformats.org/presentationml/2006/main">
+  <p:cSld>
+    <p:spTree>
+      <p:nvGrpSpPr>
+        <p:cNvPr id="1" name=""/>
+        <p:cNvGrpSpPr/>
+        <p:nvPr/>
+      </p:nvGrpSpPr>
+      <p:grpSpPr>
+        <a:xfrm>
+          <a:off x="0" y="0"/>
+          <a:ext cx="0" cy="0"/>
+          <a:chOff x="0" y="0"/>
+          <a:chExt cx="0" cy="0"/>
+        </a:xfrm>
+      </p:grpSpPr>
+      <p:sp>
+        <p:nvSpPr>
+          <p:cNvPr id="2" name="Slide Image Placeholder 1"/>
+          <p:cNvSpPr>
+            <a:spLocks noGrp="1" noRot="1" noChangeAspect="1"/>
+          </p:cNvSpPr>
+          <p:nvPr>
+            <p:ph type="sldImg"/>
+          </p:nvPr>
+        </p:nvSpPr>
+        <p:spPr/>
+      </p:sp>
+      <p:sp>
+        <p:nvSpPr>
+          <p:cNvPr id="3" name="Notes Placeholder 2"/>
+          <p:cNvSpPr>
+            <a:spLocks noGrp="1"/>
+          </p:cNvSpPr>
+          <p:nvPr>
+            <p:ph type="body" idx="1"/>
+          </p:nvPr>
+        </p:nvSpPr>
+        <p:spPr/>
+        <p:txBody>
+          <a:bodyPr/>
+          <a:lstStyle/>
+          <a:p>
+            <a:endParaRPr lang="en-US"/>
+          </a:p>
+        </p:txBody>
+      </p:sp>
+      <p:sp>
+        <p:nvSpPr>
+          <p:cNvPr id="4" name="Slide Number Placeholder 3"/>
+          <p:cNvSpPr>
+            <a:spLocks noGrp="1"/>
+          </p:cNvSpPr>
+          <p:nvPr>
+            <p:ph type="sldNum" sz="quarter" idx="10"/>
+          </p:nvPr>
+        </p:nvSpPr>
+        <p:spPr/>
+        <p:txBody>
+          <a:bodyPr/>
+          <a:lstStyle/>
+          <a:p>
+            <a:fld id="{3876E050-E992-427E-914D-D11B843CAC07}" type="slidenum">
+              <a:rPr lang="en-US" smtClean="0"/>
+              <a:pPr/>
+              <a:t>22</a:t>
+            </a:fld>
+            <a:endParaRPr lang="en-US"/>
+          </a:p>
+        </p:txBody>
+      </p:sp>
+    </p:spTree>
+    <p:extLst>
+      <p:ext uri="{BB962C8B-B14F-4D97-AF65-F5344CB8AC3E}">
+        <p14:creationId xmlns:p14="http://schemas.microsoft.com/office/powerpoint/2010/main" val="198466577"/>
+      </p:ext>
+    </p:extLst>
+  </p:cSld>
+  <p:clrMapOvr>
+    <a:masterClrMapping/>
+  </p:clrMapOvr>
+</p:notes>
+</file>
+
+<file path=ppt/notesSlides/notesSlide23.xml><?xml version="1.0" encoding="utf-8"?>
+<p:notes xmlns:a="http://schemas.openxmlformats.org/drawingml/2006/main" xmlns:r="http://schemas.openxmlformats.org/officeDocument/2006/relationships" xmlns:p="http://schemas.openxmlformats.org/presentationml/2006/main">
+  <p:cSld>
+    <p:spTree>
+      <p:nvGrpSpPr>
+        <p:cNvPr id="1" name=""/>
+        <p:cNvGrpSpPr/>
+        <p:nvPr/>
+      </p:nvGrpSpPr>
+      <p:grpSpPr>
+        <a:xfrm>
+          <a:off x="0" y="0"/>
+          <a:ext cx="0" cy="0"/>
+          <a:chOff x="0" y="0"/>
+          <a:chExt cx="0" cy="0"/>
+        </a:xfrm>
+      </p:grpSpPr>
+      <p:sp>
+        <p:nvSpPr>
+          <p:cNvPr id="2" name="Slide Image Placeholder 1"/>
+          <p:cNvSpPr>
+            <a:spLocks noGrp="1" noRot="1" noChangeAspect="1"/>
+          </p:cNvSpPr>
+          <p:nvPr>
+            <p:ph type="sldImg"/>
+          </p:nvPr>
+        </p:nvSpPr>
+        <p:spPr/>
+      </p:sp>
+      <p:sp>
+        <p:nvSpPr>
+          <p:cNvPr id="3" name="Notes Placeholder 2"/>
+          <p:cNvSpPr>
+            <a:spLocks noGrp="1"/>
+          </p:cNvSpPr>
+          <p:nvPr>
+            <p:ph type="body" idx="1"/>
+          </p:nvPr>
+        </p:nvSpPr>
+        <p:spPr/>
+        <p:txBody>
+          <a:bodyPr/>
+          <a:lstStyle/>
+          <a:p>
+            <a:endParaRPr lang="en-US"/>
+          </a:p>
+        </p:txBody>
+      </p:sp>
+      <p:sp>
+        <p:nvSpPr>
+          <p:cNvPr id="4" name="Slide Number Placeholder 3"/>
+          <p:cNvSpPr>
+            <a:spLocks noGrp="1"/>
+          </p:cNvSpPr>
+          <p:nvPr>
+            <p:ph type="sldNum" sz="quarter" idx="10"/>
+          </p:nvPr>
+        </p:nvSpPr>
+        <p:spPr/>
+        <p:txBody>
+          <a:bodyPr/>
+          <a:lstStyle/>
+          <a:p>
+            <a:fld id="{3876E050-E992-427E-914D-D11B843CAC07}" type="slidenum">
+              <a:rPr lang="en-US" smtClean="0"/>
+              <a:pPr/>
+              <a:t>23</a:t>
+            </a:fld>
+            <a:endParaRPr lang="en-US"/>
+          </a:p>
+        </p:txBody>
+      </p:sp>
+    </p:spTree>
+    <p:extLst>
+      <p:ext uri="{BB962C8B-B14F-4D97-AF65-F5344CB8AC3E}">
+        <p14:creationId xmlns:p14="http://schemas.microsoft.com/office/powerpoint/2010/main" val="2453579943"/>
+      </p:ext>
+    </p:extLst>
+  </p:cSld>
+  <p:clrMapOvr>
+    <a:masterClrMapping/>
+  </p:clrMapOvr>
+</p:notes>
+</file>
+
+<file path=ppt/notesSlides/notesSlide24.xml><?xml version="1.0" encoding="utf-8"?>
+<p:notes xmlns:a="http://schemas.openxmlformats.org/drawingml/2006/main" xmlns:r="http://schemas.openxmlformats.org/officeDocument/2006/relationships" xmlns:p="http://schemas.openxmlformats.org/presentationml/2006/main">
+  <p:cSld>
+    <p:spTree>
+      <p:nvGrpSpPr>
+        <p:cNvPr id="1" name=""/>
+        <p:cNvGrpSpPr/>
+        <p:nvPr/>
+      </p:nvGrpSpPr>
+      <p:grpSpPr>
+        <a:xfrm>
+          <a:off x="0" y="0"/>
+          <a:ext cx="0" cy="0"/>
+          <a:chOff x="0" y="0"/>
+          <a:chExt cx="0" cy="0"/>
+        </a:xfrm>
+      </p:grpSpPr>
+      <p:sp>
+        <p:nvSpPr>
+          <p:cNvPr id="2" name="Slide Image Placeholder 1"/>
+          <p:cNvSpPr>
+            <a:spLocks noGrp="1" noRot="1" noChangeAspect="1"/>
+          </p:cNvSpPr>
+          <p:nvPr>
+            <p:ph type="sldImg"/>
+          </p:nvPr>
+        </p:nvSpPr>
+        <p:spPr/>
+      </p:sp>
+      <p:sp>
+        <p:nvSpPr>
+          <p:cNvPr id="3" name="Notes Placeholder 2"/>
+          <p:cNvSpPr>
+            <a:spLocks noGrp="1"/>
+          </p:cNvSpPr>
+          <p:nvPr>
+            <p:ph type="body" idx="1"/>
+          </p:nvPr>
+        </p:nvSpPr>
+        <p:spPr/>
+        <p:txBody>
+          <a:bodyPr/>
+          <a:lstStyle/>
+          <a:p>
+            <a:endParaRPr lang="en-US"/>
+          </a:p>
+        </p:txBody>
+      </p:sp>
+      <p:sp>
+        <p:nvSpPr>
+          <p:cNvPr id="4" name="Slide Number Placeholder 3"/>
+          <p:cNvSpPr>
+            <a:spLocks noGrp="1"/>
+          </p:cNvSpPr>
+          <p:nvPr>
+            <p:ph type="sldNum" sz="quarter" idx="10"/>
+          </p:nvPr>
+        </p:nvSpPr>
+        <p:spPr/>
+        <p:txBody>
+          <a:bodyPr/>
+          <a:lstStyle/>
+          <a:p>
+            <a:fld id="{3876E050-E992-427E-914D-D11B843CAC07}" type="slidenum">
+              <a:rPr lang="en-US" smtClean="0"/>
+              <a:pPr/>
+              <a:t>24</a:t>
+            </a:fld>
+            <a:endParaRPr lang="en-US"/>
+          </a:p>
+        </p:txBody>
+      </p:sp>
+    </p:spTree>
+    <p:extLst>
+      <p:ext uri="{BB962C8B-B14F-4D97-AF65-F5344CB8AC3E}">
+        <p14:creationId xmlns:p14="http://schemas.microsoft.com/office/powerpoint/2010/main" val="1581688701"/>
+      </p:ext>
+    </p:extLst>
+  </p:cSld>
+  <p:clrMapOvr>
+    <a:masterClrMapping/>
+  </p:clrMapOvr>
+</p:notes>
+</file>
+
+<file path=ppt/notesSlides/notesSlide25.xml><?xml version="1.0" encoding="utf-8"?>
+<p:notes xmlns:a="http://schemas.openxmlformats.org/drawingml/2006/main" xmlns:r="http://schemas.openxmlformats.org/officeDocument/2006/relationships" xmlns:p="http://schemas.openxmlformats.org/presentationml/2006/main">
+  <p:cSld>
+    <p:spTree>
+      <p:nvGrpSpPr>
+        <p:cNvPr id="1" name=""/>
+        <p:cNvGrpSpPr/>
+        <p:nvPr/>
+      </p:nvGrpSpPr>
+      <p:grpSpPr>
+        <a:xfrm>
+          <a:off x="0" y="0"/>
+          <a:ext cx="0" cy="0"/>
+          <a:chOff x="0" y="0"/>
+          <a:chExt cx="0" cy="0"/>
+        </a:xfrm>
+      </p:grpSpPr>
+      <p:sp>
+        <p:nvSpPr>
+          <p:cNvPr id="2" name="Slide Image Placeholder 1"/>
+          <p:cNvSpPr>
+            <a:spLocks noGrp="1" noRot="1" noChangeAspect="1"/>
+          </p:cNvSpPr>
+          <p:nvPr>
+            <p:ph type="sldImg"/>
+          </p:nvPr>
+        </p:nvSpPr>
+        <p:spPr/>
+      </p:sp>
+      <p:sp>
+        <p:nvSpPr>
+          <p:cNvPr id="3" name="Notes Placeholder 2"/>
+          <p:cNvSpPr>
+            <a:spLocks noGrp="1"/>
+          </p:cNvSpPr>
+          <p:nvPr>
+            <p:ph type="body" idx="1"/>
+          </p:nvPr>
+        </p:nvSpPr>
+        <p:spPr/>
+        <p:txBody>
+          <a:bodyPr/>
+          <a:lstStyle/>
+          <a:p>
+            <a:endParaRPr lang="en-US"/>
+          </a:p>
+        </p:txBody>
+      </p:sp>
+      <p:sp>
+        <p:nvSpPr>
+          <p:cNvPr id="4" name="Slide Number Placeholder 3"/>
+          <p:cNvSpPr>
+            <a:spLocks noGrp="1"/>
+          </p:cNvSpPr>
+          <p:nvPr>
+            <p:ph type="sldNum" sz="quarter" idx="10"/>
+          </p:nvPr>
+        </p:nvSpPr>
+        <p:spPr/>
+        <p:txBody>
+          <a:bodyPr/>
+          <a:lstStyle/>
+          <a:p>
+            <a:fld id="{3876E050-E992-427E-914D-D11B843CAC07}" type="slidenum">
+              <a:rPr lang="en-US" smtClean="0"/>
+              <a:pPr/>
+              <a:t>25</a:t>
+            </a:fld>
+            <a:endParaRPr lang="en-US"/>
+          </a:p>
+        </p:txBody>
+      </p:sp>
+    </p:spTree>
+    <p:extLst>
+      <p:ext uri="{BB962C8B-B14F-4D97-AF65-F5344CB8AC3E}">
+        <p14:creationId xmlns:p14="http://schemas.microsoft.com/office/powerpoint/2010/main" val="747621365"/>
+      </p:ext>
+    </p:extLst>
+  </p:cSld>
+  <p:clrMapOvr>
+    <a:masterClrMapping/>
+  </p:clrMapOvr>
+</p:notes>
+</file>
+
+<file path=ppt/notesSlides/notesSlide26.xml><?xml version="1.0" encoding="utf-8"?>
+<p:notes xmlns:a="http://schemas.openxmlformats.org/drawingml/2006/main" xmlns:r="http://schemas.openxmlformats.org/officeDocument/2006/relationships" xmlns:p="http://schemas.openxmlformats.org/presentationml/2006/main">
+  <p:cSld>
+    <p:spTree>
+      <p:nvGrpSpPr>
+        <p:cNvPr id="1" name=""/>
+        <p:cNvGrpSpPr/>
+        <p:nvPr/>
+      </p:nvGrpSpPr>
+      <p:grpSpPr>
+        <a:xfrm>
+          <a:off x="0" y="0"/>
+          <a:ext cx="0" cy="0"/>
+          <a:chOff x="0" y="0"/>
+          <a:chExt cx="0" cy="0"/>
+        </a:xfrm>
+      </p:grpSpPr>
+      <p:sp>
+        <p:nvSpPr>
+          <p:cNvPr id="2" name="Slide Image Placeholder 1"/>
+          <p:cNvSpPr>
+            <a:spLocks noGrp="1" noRot="1" noChangeAspect="1"/>
+          </p:cNvSpPr>
+          <p:nvPr>
+            <p:ph type="sldImg"/>
+          </p:nvPr>
+        </p:nvSpPr>
+        <p:spPr/>
+      </p:sp>
+      <p:sp>
+        <p:nvSpPr>
+          <p:cNvPr id="3" name="Notes Placeholder 2"/>
+          <p:cNvSpPr>
+            <a:spLocks noGrp="1"/>
+          </p:cNvSpPr>
+          <p:nvPr>
+            <p:ph type="body" idx="1"/>
+          </p:nvPr>
+        </p:nvSpPr>
+        <p:spPr/>
+        <p:txBody>
+          <a:bodyPr/>
+          <a:lstStyle/>
+          <a:p>
+            <a:endParaRPr lang="en-US"/>
+          </a:p>
+        </p:txBody>
+      </p:sp>
+      <p:sp>
+        <p:nvSpPr>
+          <p:cNvPr id="4" name="Slide Number Placeholder 3"/>
+          <p:cNvSpPr>
+            <a:spLocks noGrp="1"/>
+          </p:cNvSpPr>
+          <p:nvPr>
+            <p:ph type="sldNum" sz="quarter" idx="10"/>
+          </p:nvPr>
+        </p:nvSpPr>
+        <p:spPr/>
+        <p:txBody>
+          <a:bodyPr/>
+          <a:lstStyle/>
+          <a:p>
+            <a:fld id="{3876E050-E992-427E-914D-D11B843CAC07}" type="slidenum">
+              <a:rPr lang="en-US" smtClean="0"/>
+              <a:pPr/>
+              <a:t>26</a:t>
+            </a:fld>
+            <a:endParaRPr lang="en-US"/>
+          </a:p>
+        </p:txBody>
+      </p:sp>
+    </p:spTree>
+    <p:extLst>
+      <p:ext uri="{BB962C8B-B14F-4D97-AF65-F5344CB8AC3E}">
+        <p14:creationId xmlns:p14="http://schemas.microsoft.com/office/powerpoint/2010/main" val="3971594312"/>
+      </p:ext>
+    </p:extLst>
+  </p:cSld>
+  <p:clrMapOvr>
+    <a:masterClrMapping/>
+  </p:clrMapOvr>
+</p:notes>
+</file>
+
+<file path=ppt/notesSlides/notesSlide27.xml><?xml version="1.0" encoding="utf-8"?>
+<p:notes xmlns:a="http://schemas.openxmlformats.org/drawingml/2006/main" xmlns:r="http://schemas.openxmlformats.org/officeDocument/2006/relationships" xmlns:p="http://schemas.openxmlformats.org/presentationml/2006/main">
+  <p:cSld>
+    <p:spTree>
+      <p:nvGrpSpPr>
+        <p:cNvPr id="1" name=""/>
+        <p:cNvGrpSpPr/>
+        <p:nvPr/>
+      </p:nvGrpSpPr>
+      <p:grpSpPr>
+        <a:xfrm>
+          <a:off x="0" y="0"/>
+          <a:ext cx="0" cy="0"/>
+          <a:chOff x="0" y="0"/>
+          <a:chExt cx="0" cy="0"/>
+        </a:xfrm>
+      </p:grpSpPr>
+      <p:sp>
+        <p:nvSpPr>
+          <p:cNvPr id="2" name="Slide Image Placeholder 1"/>
+          <p:cNvSpPr>
+            <a:spLocks noGrp="1" noRot="1" noChangeAspect="1"/>
+          </p:cNvSpPr>
+          <p:nvPr>
+            <p:ph type="sldImg"/>
+          </p:nvPr>
+        </p:nvSpPr>
+        <p:spPr/>
+      </p:sp>
+      <p:sp>
+        <p:nvSpPr>
+          <p:cNvPr id="3" name="Notes Placeholder 2"/>
+          <p:cNvSpPr>
+            <a:spLocks noGrp="1"/>
+          </p:cNvSpPr>
+          <p:nvPr>
+            <p:ph type="body" idx="1"/>
+          </p:nvPr>
+        </p:nvSpPr>
+        <p:spPr/>
+        <p:txBody>
+          <a:bodyPr/>
+          <a:lstStyle/>
+          <a:p>
+            <a:endParaRPr lang="en-US"/>
+          </a:p>
+        </p:txBody>
+      </p:sp>
+      <p:sp>
+        <p:nvSpPr>
+          <p:cNvPr id="4" name="Slide Number Placeholder 3"/>
+          <p:cNvSpPr>
+            <a:spLocks noGrp="1"/>
+          </p:cNvSpPr>
+          <p:nvPr>
+            <p:ph type="sldNum" sz="quarter" idx="10"/>
+          </p:nvPr>
+        </p:nvSpPr>
+        <p:spPr/>
+        <p:txBody>
+          <a:bodyPr/>
+          <a:lstStyle/>
+          <a:p>
+            <a:fld id="{3876E050-E992-427E-914D-D11B843CAC07}" type="slidenum">
+              <a:rPr lang="en-US" smtClean="0"/>
+              <a:pPr/>
+              <a:t>27</a:t>
+            </a:fld>
+            <a:endParaRPr lang="en-US"/>
+          </a:p>
+        </p:txBody>
+      </p:sp>
+    </p:spTree>
+    <p:extLst>
+      <p:ext uri="{BB962C8B-B14F-4D97-AF65-F5344CB8AC3E}">
+        <p14:creationId xmlns:p14="http://schemas.microsoft.com/office/powerpoint/2010/main" val="257314362"/>
+      </p:ext>
+    </p:extLst>
+  </p:cSld>
+  <p:clrMapOvr>
+    <a:masterClrMapping/>
+  </p:clrMapOvr>
+</p:notes>
+</file>
+
+<file path=ppt/notesSlides/notesSlide28.xml><?xml version="1.0" encoding="utf-8"?>
+<p:notes xmlns:a="http://schemas.openxmlformats.org/drawingml/2006/main" xmlns:r="http://schemas.openxmlformats.org/officeDocument/2006/relationships" xmlns:p="http://schemas.openxmlformats.org/presentationml/2006/main">
+  <p:cSld>
+    <p:spTree>
+      <p:nvGrpSpPr>
+        <p:cNvPr id="1" name=""/>
+        <p:cNvGrpSpPr/>
+        <p:nvPr/>
+      </p:nvGrpSpPr>
+      <p:grpSpPr>
+        <a:xfrm>
+          <a:off x="0" y="0"/>
+          <a:ext cx="0" cy="0"/>
+          <a:chOff x="0" y="0"/>
+          <a:chExt cx="0" cy="0"/>
+        </a:xfrm>
+      </p:grpSpPr>
+      <p:sp>
+        <p:nvSpPr>
+          <p:cNvPr id="2" name="Slide Image Placeholder 1"/>
+          <p:cNvSpPr>
+            <a:spLocks noGrp="1" noRot="1" noChangeAspect="1"/>
+          </p:cNvSpPr>
+          <p:nvPr>
+            <p:ph type="sldImg"/>
+          </p:nvPr>
+        </p:nvSpPr>
+        <p:spPr/>
+      </p:sp>
+      <p:sp>
+        <p:nvSpPr>
+          <p:cNvPr id="3" name="Notes Placeholder 2"/>
+          <p:cNvSpPr>
+            <a:spLocks noGrp="1"/>
+          </p:cNvSpPr>
+          <p:nvPr>
+            <p:ph type="body" idx="1"/>
+          </p:nvPr>
+        </p:nvSpPr>
+        <p:spPr/>
+        <p:txBody>
+          <a:bodyPr/>
+          <a:lstStyle/>
+          <a:p>
+            <a:endParaRPr lang="en-US"/>
+          </a:p>
+        </p:txBody>
+      </p:sp>
+      <p:sp>
+        <p:nvSpPr>
+          <p:cNvPr id="4" name="Slide Number Placeholder 3"/>
+          <p:cNvSpPr>
+            <a:spLocks noGrp="1"/>
+          </p:cNvSpPr>
+          <p:nvPr>
+            <p:ph type="sldNum" sz="quarter" idx="10"/>
+          </p:nvPr>
+        </p:nvSpPr>
+        <p:spPr/>
+        <p:txBody>
+          <a:bodyPr/>
+          <a:lstStyle/>
+          <a:p>
+            <a:fld id="{3876E050-E992-427E-914D-D11B843CAC07}" type="slidenum">
+              <a:rPr lang="en-US" smtClean="0"/>
+              <a:pPr/>
+              <a:t>28</a:t>
+            </a:fld>
+            <a:endParaRPr lang="en-US"/>
+          </a:p>
+        </p:txBody>
+      </p:sp>
+    </p:spTree>
+    <p:extLst>
+      <p:ext uri="{BB962C8B-B14F-4D97-AF65-F5344CB8AC3E}">
+        <p14:creationId xmlns:p14="http://schemas.microsoft.com/office/powerpoint/2010/main" val="2226051059"/>
       </p:ext>
     </p:extLst>
   </p:cSld>
@@ -727,7 +2340,7 @@
           <a:bodyPr/>
           <a:lstStyle/>
           <a:p>
-            <a:endParaRPr lang="en-US" b="1" dirty="0"/>
+            <a:endParaRPr lang="en-US"/>
           </a:p>
         </p:txBody>
       </p:sp>
@@ -746,9 +2359,10 @@
           <a:bodyPr/>
           <a:lstStyle/>
           <a:p>
-            <a:fld id="{D3C86B6F-9679-C544-B86B-D18AA0460570}" type="slidenum">
+            <a:fld id="{3876E050-E992-427E-914D-D11B843CAC07}" type="slidenum">
               <a:rPr lang="en-US" smtClean="0"/>
-              <a:t>18</a:t>
+              <a:pPr/>
+              <a:t>3</a:t>
             </a:fld>
             <a:endParaRPr lang="en-US"/>
           </a:p>
@@ -757,7 +2371,7 @@
     </p:spTree>
     <p:extLst>
       <p:ext uri="{BB962C8B-B14F-4D97-AF65-F5344CB8AC3E}">
-        <p14:creationId xmlns:p14="http://schemas.microsoft.com/office/powerpoint/2010/main" val="3085232185"/>
+        <p14:creationId xmlns:p14="http://schemas.microsoft.com/office/powerpoint/2010/main" val="4004111461"/>
       </p:ext>
     </p:extLst>
   </p:cSld>
@@ -811,7 +2425,7 @@
           <a:bodyPr/>
           <a:lstStyle/>
           <a:p>
-            <a:endParaRPr lang="en-US" dirty="0"/>
+            <a:endParaRPr lang="en-US"/>
           </a:p>
         </p:txBody>
       </p:sp>
@@ -830,9 +2444,10 @@
           <a:bodyPr/>
           <a:lstStyle/>
           <a:p>
-            <a:fld id="{D3C86B6F-9679-C544-B86B-D18AA0460570}" type="slidenum">
+            <a:fld id="{3876E050-E992-427E-914D-D11B843CAC07}" type="slidenum">
               <a:rPr lang="en-US" smtClean="0"/>
-              <a:t>19</a:t>
+              <a:pPr/>
+              <a:t>4</a:t>
             </a:fld>
             <a:endParaRPr lang="en-US"/>
           </a:p>
@@ -841,7 +2456,432 @@
     </p:spTree>
     <p:extLst>
       <p:ext uri="{BB962C8B-B14F-4D97-AF65-F5344CB8AC3E}">
-        <p14:creationId xmlns:p14="http://schemas.microsoft.com/office/powerpoint/2010/main" val="365138427"/>
+        <p14:creationId xmlns:p14="http://schemas.microsoft.com/office/powerpoint/2010/main" val="4062910053"/>
+      </p:ext>
+    </p:extLst>
+  </p:cSld>
+  <p:clrMapOvr>
+    <a:masterClrMapping/>
+  </p:clrMapOvr>
+</p:notes>
+</file>
+
+<file path=ppt/notesSlides/notesSlide5.xml><?xml version="1.0" encoding="utf-8"?>
+<p:notes xmlns:a="http://schemas.openxmlformats.org/drawingml/2006/main" xmlns:r="http://schemas.openxmlformats.org/officeDocument/2006/relationships" xmlns:p="http://schemas.openxmlformats.org/presentationml/2006/main">
+  <p:cSld>
+    <p:spTree>
+      <p:nvGrpSpPr>
+        <p:cNvPr id="1" name=""/>
+        <p:cNvGrpSpPr/>
+        <p:nvPr/>
+      </p:nvGrpSpPr>
+      <p:grpSpPr>
+        <a:xfrm>
+          <a:off x="0" y="0"/>
+          <a:ext cx="0" cy="0"/>
+          <a:chOff x="0" y="0"/>
+          <a:chExt cx="0" cy="0"/>
+        </a:xfrm>
+      </p:grpSpPr>
+      <p:sp>
+        <p:nvSpPr>
+          <p:cNvPr id="2" name="Slide Image Placeholder 1"/>
+          <p:cNvSpPr>
+            <a:spLocks noGrp="1" noRot="1" noChangeAspect="1"/>
+          </p:cNvSpPr>
+          <p:nvPr>
+            <p:ph type="sldImg"/>
+          </p:nvPr>
+        </p:nvSpPr>
+        <p:spPr/>
+      </p:sp>
+      <p:sp>
+        <p:nvSpPr>
+          <p:cNvPr id="3" name="Notes Placeholder 2"/>
+          <p:cNvSpPr>
+            <a:spLocks noGrp="1"/>
+          </p:cNvSpPr>
+          <p:nvPr>
+            <p:ph type="body" idx="1"/>
+          </p:nvPr>
+        </p:nvSpPr>
+        <p:spPr/>
+        <p:txBody>
+          <a:bodyPr/>
+          <a:lstStyle/>
+          <a:p>
+            <a:endParaRPr lang="en-US" dirty="0"/>
+          </a:p>
+        </p:txBody>
+      </p:sp>
+      <p:sp>
+        <p:nvSpPr>
+          <p:cNvPr id="4" name="Slide Number Placeholder 3"/>
+          <p:cNvSpPr>
+            <a:spLocks noGrp="1"/>
+          </p:cNvSpPr>
+          <p:nvPr>
+            <p:ph type="sldNum" sz="quarter" idx="10"/>
+          </p:nvPr>
+        </p:nvSpPr>
+        <p:spPr/>
+        <p:txBody>
+          <a:bodyPr/>
+          <a:lstStyle/>
+          <a:p>
+            <a:fld id="{3876E050-E992-427E-914D-D11B843CAC07}" type="slidenum">
+              <a:rPr lang="en-US" smtClean="0"/>
+              <a:pPr/>
+              <a:t>5</a:t>
+            </a:fld>
+            <a:endParaRPr lang="en-US"/>
+          </a:p>
+        </p:txBody>
+      </p:sp>
+    </p:spTree>
+    <p:extLst>
+      <p:ext uri="{BB962C8B-B14F-4D97-AF65-F5344CB8AC3E}">
+        <p14:creationId xmlns:p14="http://schemas.microsoft.com/office/powerpoint/2010/main" val="2129791700"/>
+      </p:ext>
+    </p:extLst>
+  </p:cSld>
+  <p:clrMapOvr>
+    <a:masterClrMapping/>
+  </p:clrMapOvr>
+</p:notes>
+</file>
+
+<file path=ppt/notesSlides/notesSlide6.xml><?xml version="1.0" encoding="utf-8"?>
+<p:notes xmlns:a="http://schemas.openxmlformats.org/drawingml/2006/main" xmlns:r="http://schemas.openxmlformats.org/officeDocument/2006/relationships" xmlns:p="http://schemas.openxmlformats.org/presentationml/2006/main">
+  <p:cSld>
+    <p:spTree>
+      <p:nvGrpSpPr>
+        <p:cNvPr id="1" name=""/>
+        <p:cNvGrpSpPr/>
+        <p:nvPr/>
+      </p:nvGrpSpPr>
+      <p:grpSpPr>
+        <a:xfrm>
+          <a:off x="0" y="0"/>
+          <a:ext cx="0" cy="0"/>
+          <a:chOff x="0" y="0"/>
+          <a:chExt cx="0" cy="0"/>
+        </a:xfrm>
+      </p:grpSpPr>
+      <p:sp>
+        <p:nvSpPr>
+          <p:cNvPr id="2" name="Slide Image Placeholder 1"/>
+          <p:cNvSpPr>
+            <a:spLocks noGrp="1" noRot="1" noChangeAspect="1"/>
+          </p:cNvSpPr>
+          <p:nvPr>
+            <p:ph type="sldImg"/>
+          </p:nvPr>
+        </p:nvSpPr>
+        <p:spPr/>
+      </p:sp>
+      <p:sp>
+        <p:nvSpPr>
+          <p:cNvPr id="3" name="Notes Placeholder 2"/>
+          <p:cNvSpPr>
+            <a:spLocks noGrp="1"/>
+          </p:cNvSpPr>
+          <p:nvPr>
+            <p:ph type="body" idx="1"/>
+          </p:nvPr>
+        </p:nvSpPr>
+        <p:spPr/>
+        <p:txBody>
+          <a:bodyPr/>
+          <a:lstStyle/>
+          <a:p>
+            <a:endParaRPr lang="en-US"/>
+          </a:p>
+        </p:txBody>
+      </p:sp>
+      <p:sp>
+        <p:nvSpPr>
+          <p:cNvPr id="4" name="Slide Number Placeholder 3"/>
+          <p:cNvSpPr>
+            <a:spLocks noGrp="1"/>
+          </p:cNvSpPr>
+          <p:nvPr>
+            <p:ph type="sldNum" sz="quarter" idx="10"/>
+          </p:nvPr>
+        </p:nvSpPr>
+        <p:spPr/>
+        <p:txBody>
+          <a:bodyPr/>
+          <a:lstStyle/>
+          <a:p>
+            <a:fld id="{3876E050-E992-427E-914D-D11B843CAC07}" type="slidenum">
+              <a:rPr lang="en-US" smtClean="0"/>
+              <a:pPr/>
+              <a:t>6</a:t>
+            </a:fld>
+            <a:endParaRPr lang="en-US"/>
+          </a:p>
+        </p:txBody>
+      </p:sp>
+    </p:spTree>
+    <p:extLst>
+      <p:ext uri="{BB962C8B-B14F-4D97-AF65-F5344CB8AC3E}">
+        <p14:creationId xmlns:p14="http://schemas.microsoft.com/office/powerpoint/2010/main" val="4162430612"/>
+      </p:ext>
+    </p:extLst>
+  </p:cSld>
+  <p:clrMapOvr>
+    <a:masterClrMapping/>
+  </p:clrMapOvr>
+</p:notes>
+</file>
+
+<file path=ppt/notesSlides/notesSlide7.xml><?xml version="1.0" encoding="utf-8"?>
+<p:notes xmlns:a="http://schemas.openxmlformats.org/drawingml/2006/main" xmlns:r="http://schemas.openxmlformats.org/officeDocument/2006/relationships" xmlns:p="http://schemas.openxmlformats.org/presentationml/2006/main">
+  <p:cSld>
+    <p:spTree>
+      <p:nvGrpSpPr>
+        <p:cNvPr id="1" name=""/>
+        <p:cNvGrpSpPr/>
+        <p:nvPr/>
+      </p:nvGrpSpPr>
+      <p:grpSpPr>
+        <a:xfrm>
+          <a:off x="0" y="0"/>
+          <a:ext cx="0" cy="0"/>
+          <a:chOff x="0" y="0"/>
+          <a:chExt cx="0" cy="0"/>
+        </a:xfrm>
+      </p:grpSpPr>
+      <p:sp>
+        <p:nvSpPr>
+          <p:cNvPr id="2" name="Slide Image Placeholder 1"/>
+          <p:cNvSpPr>
+            <a:spLocks noGrp="1" noRot="1" noChangeAspect="1"/>
+          </p:cNvSpPr>
+          <p:nvPr>
+            <p:ph type="sldImg"/>
+          </p:nvPr>
+        </p:nvSpPr>
+        <p:spPr/>
+      </p:sp>
+      <p:sp>
+        <p:nvSpPr>
+          <p:cNvPr id="3" name="Notes Placeholder 2"/>
+          <p:cNvSpPr>
+            <a:spLocks noGrp="1"/>
+          </p:cNvSpPr>
+          <p:nvPr>
+            <p:ph type="body" idx="1"/>
+          </p:nvPr>
+        </p:nvSpPr>
+        <p:spPr/>
+        <p:txBody>
+          <a:bodyPr/>
+          <a:lstStyle/>
+          <a:p>
+            <a:endParaRPr lang="en-US"/>
+          </a:p>
+        </p:txBody>
+      </p:sp>
+      <p:sp>
+        <p:nvSpPr>
+          <p:cNvPr id="4" name="Slide Number Placeholder 3"/>
+          <p:cNvSpPr>
+            <a:spLocks noGrp="1"/>
+          </p:cNvSpPr>
+          <p:nvPr>
+            <p:ph type="sldNum" sz="quarter" idx="10"/>
+          </p:nvPr>
+        </p:nvSpPr>
+        <p:spPr/>
+        <p:txBody>
+          <a:bodyPr/>
+          <a:lstStyle/>
+          <a:p>
+            <a:fld id="{3876E050-E992-427E-914D-D11B843CAC07}" type="slidenum">
+              <a:rPr lang="en-US" smtClean="0"/>
+              <a:pPr/>
+              <a:t>7</a:t>
+            </a:fld>
+            <a:endParaRPr lang="en-US"/>
+          </a:p>
+        </p:txBody>
+      </p:sp>
+    </p:spTree>
+    <p:extLst>
+      <p:ext uri="{BB962C8B-B14F-4D97-AF65-F5344CB8AC3E}">
+        <p14:creationId xmlns:p14="http://schemas.microsoft.com/office/powerpoint/2010/main" val="5947333"/>
+      </p:ext>
+    </p:extLst>
+  </p:cSld>
+  <p:clrMapOvr>
+    <a:masterClrMapping/>
+  </p:clrMapOvr>
+</p:notes>
+</file>
+
+<file path=ppt/notesSlides/notesSlide8.xml><?xml version="1.0" encoding="utf-8"?>
+<p:notes xmlns:a="http://schemas.openxmlformats.org/drawingml/2006/main" xmlns:r="http://schemas.openxmlformats.org/officeDocument/2006/relationships" xmlns:p="http://schemas.openxmlformats.org/presentationml/2006/main">
+  <p:cSld>
+    <p:spTree>
+      <p:nvGrpSpPr>
+        <p:cNvPr id="1" name=""/>
+        <p:cNvGrpSpPr/>
+        <p:nvPr/>
+      </p:nvGrpSpPr>
+      <p:grpSpPr>
+        <a:xfrm>
+          <a:off x="0" y="0"/>
+          <a:ext cx="0" cy="0"/>
+          <a:chOff x="0" y="0"/>
+          <a:chExt cx="0" cy="0"/>
+        </a:xfrm>
+      </p:grpSpPr>
+      <p:sp>
+        <p:nvSpPr>
+          <p:cNvPr id="2" name="Slide Image Placeholder 1"/>
+          <p:cNvSpPr>
+            <a:spLocks noGrp="1" noRot="1" noChangeAspect="1"/>
+          </p:cNvSpPr>
+          <p:nvPr>
+            <p:ph type="sldImg"/>
+          </p:nvPr>
+        </p:nvSpPr>
+        <p:spPr/>
+      </p:sp>
+      <p:sp>
+        <p:nvSpPr>
+          <p:cNvPr id="3" name="Notes Placeholder 2"/>
+          <p:cNvSpPr>
+            <a:spLocks noGrp="1"/>
+          </p:cNvSpPr>
+          <p:nvPr>
+            <p:ph type="body" idx="1"/>
+          </p:nvPr>
+        </p:nvSpPr>
+        <p:spPr/>
+        <p:txBody>
+          <a:bodyPr/>
+          <a:lstStyle/>
+          <a:p>
+            <a:endParaRPr lang="en-US"/>
+          </a:p>
+        </p:txBody>
+      </p:sp>
+      <p:sp>
+        <p:nvSpPr>
+          <p:cNvPr id="4" name="Slide Number Placeholder 3"/>
+          <p:cNvSpPr>
+            <a:spLocks noGrp="1"/>
+          </p:cNvSpPr>
+          <p:nvPr>
+            <p:ph type="sldNum" sz="quarter" idx="10"/>
+          </p:nvPr>
+        </p:nvSpPr>
+        <p:spPr/>
+        <p:txBody>
+          <a:bodyPr/>
+          <a:lstStyle/>
+          <a:p>
+            <a:fld id="{3876E050-E992-427E-914D-D11B843CAC07}" type="slidenum">
+              <a:rPr lang="en-US" smtClean="0"/>
+              <a:pPr/>
+              <a:t>8</a:t>
+            </a:fld>
+            <a:endParaRPr lang="en-US"/>
+          </a:p>
+        </p:txBody>
+      </p:sp>
+    </p:spTree>
+    <p:extLst>
+      <p:ext uri="{BB962C8B-B14F-4D97-AF65-F5344CB8AC3E}">
+        <p14:creationId xmlns:p14="http://schemas.microsoft.com/office/powerpoint/2010/main" val="1138592879"/>
+      </p:ext>
+    </p:extLst>
+  </p:cSld>
+  <p:clrMapOvr>
+    <a:masterClrMapping/>
+  </p:clrMapOvr>
+</p:notes>
+</file>
+
+<file path=ppt/notesSlides/notesSlide9.xml><?xml version="1.0" encoding="utf-8"?>
+<p:notes xmlns:a="http://schemas.openxmlformats.org/drawingml/2006/main" xmlns:r="http://schemas.openxmlformats.org/officeDocument/2006/relationships" xmlns:p="http://schemas.openxmlformats.org/presentationml/2006/main">
+  <p:cSld>
+    <p:spTree>
+      <p:nvGrpSpPr>
+        <p:cNvPr id="1" name=""/>
+        <p:cNvGrpSpPr/>
+        <p:nvPr/>
+      </p:nvGrpSpPr>
+      <p:grpSpPr>
+        <a:xfrm>
+          <a:off x="0" y="0"/>
+          <a:ext cx="0" cy="0"/>
+          <a:chOff x="0" y="0"/>
+          <a:chExt cx="0" cy="0"/>
+        </a:xfrm>
+      </p:grpSpPr>
+      <p:sp>
+        <p:nvSpPr>
+          <p:cNvPr id="2" name="Slide Image Placeholder 1"/>
+          <p:cNvSpPr>
+            <a:spLocks noGrp="1" noRot="1" noChangeAspect="1"/>
+          </p:cNvSpPr>
+          <p:nvPr>
+            <p:ph type="sldImg"/>
+          </p:nvPr>
+        </p:nvSpPr>
+        <p:spPr/>
+      </p:sp>
+      <p:sp>
+        <p:nvSpPr>
+          <p:cNvPr id="3" name="Notes Placeholder 2"/>
+          <p:cNvSpPr>
+            <a:spLocks noGrp="1"/>
+          </p:cNvSpPr>
+          <p:nvPr>
+            <p:ph type="body" idx="1"/>
+          </p:nvPr>
+        </p:nvSpPr>
+        <p:spPr/>
+        <p:txBody>
+          <a:bodyPr/>
+          <a:lstStyle/>
+          <a:p>
+            <a:endParaRPr lang="en-US"/>
+          </a:p>
+        </p:txBody>
+      </p:sp>
+      <p:sp>
+        <p:nvSpPr>
+          <p:cNvPr id="4" name="Slide Number Placeholder 3"/>
+          <p:cNvSpPr>
+            <a:spLocks noGrp="1"/>
+          </p:cNvSpPr>
+          <p:nvPr>
+            <p:ph type="sldNum" sz="quarter" idx="10"/>
+          </p:nvPr>
+        </p:nvSpPr>
+        <p:spPr/>
+        <p:txBody>
+          <a:bodyPr/>
+          <a:lstStyle/>
+          <a:p>
+            <a:fld id="{3876E050-E992-427E-914D-D11B843CAC07}" type="slidenum">
+              <a:rPr lang="en-US" smtClean="0"/>
+              <a:pPr/>
+              <a:t>9</a:t>
+            </a:fld>
+            <a:endParaRPr lang="en-US"/>
+          </a:p>
+        </p:txBody>
+      </p:sp>
+    </p:spTree>
+    <p:extLst>
+      <p:ext uri="{BB962C8B-B14F-4D97-AF65-F5344CB8AC3E}">
+        <p14:creationId xmlns:p14="http://schemas.microsoft.com/office/powerpoint/2010/main" val="897188409"/>
       </p:ext>
     </p:extLst>
   </p:cSld>
@@ -4850,9 +6890,10 @@
           </a:p>
           <a:p>
             <a:r>
-              <a:rPr lang="en-US" dirty="0"/>
-              <a:t>Lesson 9.5</a:t>
-            </a:r>
+              <a:rPr lang="en-US"/>
+              <a:t>Lesson 9.6</a:t>
+            </a:r>
+            <a:endParaRPr lang="en-US" dirty="0"/>
           </a:p>
         </p:txBody>
       </p:sp>

</xml_diff>